<commit_message>
added inference service tests
</commit_message>
<xml_diff>
--- a/docs/site/assets/images/success6g_edge_architecture.pptx
+++ b/docs/site/assets/images/success6g_edge_architecture.pptx
@@ -15,8 +15,9 @@
     <p:sldId id="277" r:id="rId9"/>
     <p:sldId id="276" r:id="rId10"/>
     <p:sldId id="259" r:id="rId11"/>
-    <p:sldId id="283" r:id="rId12"/>
-    <p:sldId id="284" r:id="rId13"/>
+    <p:sldId id="285" r:id="rId12"/>
+    <p:sldId id="283" r:id="rId13"/>
+    <p:sldId id="284" r:id="rId14"/>
   </p:sldIdLst>
   <p:sldSz cx="12192000" cy="6858000"/>
   <p:notesSz cx="7315200" cy="9601200"/>
@@ -270,7 +271,7 @@
           <a:p>
             <a:fld id="{9952FCE7-4E71-40A9-B3AA-F4BE5BA13E2A}" type="datetimeFigureOut">
               <a:rPr lang="en-US" smtClean="0"/>
-              <a:t>7/26/2024</a:t>
+              <a:t>8/12/2024</a:t>
             </a:fld>
             <a:endParaRPr lang="en-US"/>
           </a:p>
@@ -468,7 +469,7 @@
           <a:p>
             <a:fld id="{9952FCE7-4E71-40A9-B3AA-F4BE5BA13E2A}" type="datetimeFigureOut">
               <a:rPr lang="en-US" smtClean="0"/>
-              <a:t>7/26/2024</a:t>
+              <a:t>8/12/2024</a:t>
             </a:fld>
             <a:endParaRPr lang="en-US"/>
           </a:p>
@@ -676,7 +677,7 @@
           <a:p>
             <a:fld id="{9952FCE7-4E71-40A9-B3AA-F4BE5BA13E2A}" type="datetimeFigureOut">
               <a:rPr lang="en-US" smtClean="0"/>
-              <a:t>7/26/2024</a:t>
+              <a:t>8/12/2024</a:t>
             </a:fld>
             <a:endParaRPr lang="en-US"/>
           </a:p>
@@ -874,7 +875,7 @@
           <a:p>
             <a:fld id="{9952FCE7-4E71-40A9-B3AA-F4BE5BA13E2A}" type="datetimeFigureOut">
               <a:rPr lang="en-US" smtClean="0"/>
-              <a:t>7/26/2024</a:t>
+              <a:t>8/12/2024</a:t>
             </a:fld>
             <a:endParaRPr lang="en-US"/>
           </a:p>
@@ -1149,7 +1150,7 @@
           <a:p>
             <a:fld id="{9952FCE7-4E71-40A9-B3AA-F4BE5BA13E2A}" type="datetimeFigureOut">
               <a:rPr lang="en-US" smtClean="0"/>
-              <a:t>7/26/2024</a:t>
+              <a:t>8/12/2024</a:t>
             </a:fld>
             <a:endParaRPr lang="en-US"/>
           </a:p>
@@ -1414,7 +1415,7 @@
           <a:p>
             <a:fld id="{9952FCE7-4E71-40A9-B3AA-F4BE5BA13E2A}" type="datetimeFigureOut">
               <a:rPr lang="en-US" smtClean="0"/>
-              <a:t>7/26/2024</a:t>
+              <a:t>8/12/2024</a:t>
             </a:fld>
             <a:endParaRPr lang="en-US"/>
           </a:p>
@@ -1826,7 +1827,7 @@
           <a:p>
             <a:fld id="{9952FCE7-4E71-40A9-B3AA-F4BE5BA13E2A}" type="datetimeFigureOut">
               <a:rPr lang="en-US" smtClean="0"/>
-              <a:t>7/26/2024</a:t>
+              <a:t>8/12/2024</a:t>
             </a:fld>
             <a:endParaRPr lang="en-US"/>
           </a:p>
@@ -1967,7 +1968,7 @@
           <a:p>
             <a:fld id="{9952FCE7-4E71-40A9-B3AA-F4BE5BA13E2A}" type="datetimeFigureOut">
               <a:rPr lang="en-US" smtClean="0"/>
-              <a:t>7/26/2024</a:t>
+              <a:t>8/12/2024</a:t>
             </a:fld>
             <a:endParaRPr lang="en-US"/>
           </a:p>
@@ -2080,7 +2081,7 @@
           <a:p>
             <a:fld id="{9952FCE7-4E71-40A9-B3AA-F4BE5BA13E2A}" type="datetimeFigureOut">
               <a:rPr lang="en-US" smtClean="0"/>
-              <a:t>7/26/2024</a:t>
+              <a:t>8/12/2024</a:t>
             </a:fld>
             <a:endParaRPr lang="en-US"/>
           </a:p>
@@ -2391,7 +2392,7 @@
           <a:p>
             <a:fld id="{9952FCE7-4E71-40A9-B3AA-F4BE5BA13E2A}" type="datetimeFigureOut">
               <a:rPr lang="en-US" smtClean="0"/>
-              <a:t>7/26/2024</a:t>
+              <a:t>8/12/2024</a:t>
             </a:fld>
             <a:endParaRPr lang="en-US"/>
           </a:p>
@@ -2679,7 +2680,7 @@
           <a:p>
             <a:fld id="{9952FCE7-4E71-40A9-B3AA-F4BE5BA13E2A}" type="datetimeFigureOut">
               <a:rPr lang="en-US" smtClean="0"/>
-              <a:t>7/26/2024</a:t>
+              <a:t>8/12/2024</a:t>
             </a:fld>
             <a:endParaRPr lang="en-US"/>
           </a:p>
@@ -2920,7 +2921,7 @@
           <a:p>
             <a:fld id="{9952FCE7-4E71-40A9-B3AA-F4BE5BA13E2A}" type="datetimeFigureOut">
               <a:rPr lang="en-US" smtClean="0"/>
-              <a:t>7/26/2024</a:t>
+              <a:t>8/12/2024</a:t>
             </a:fld>
             <a:endParaRPr lang="en-US"/>
           </a:p>
@@ -6136,6 +6137,1033 @@
 </file>
 
 <file path=ppt/slides/slide11.xml><?xml version="1.0" encoding="utf-8"?>
+<p:sld xmlns:a="http://schemas.openxmlformats.org/drawingml/2006/main" xmlns:r="http://schemas.openxmlformats.org/officeDocument/2006/relationships" xmlns:p="http://schemas.openxmlformats.org/presentationml/2006/main">
+  <p:cSld>
+    <p:spTree>
+      <p:nvGrpSpPr>
+        <p:cNvPr id="1" name=""/>
+        <p:cNvGrpSpPr/>
+        <p:nvPr/>
+      </p:nvGrpSpPr>
+      <p:grpSpPr>
+        <a:xfrm>
+          <a:off x="0" y="0"/>
+          <a:ext cx="0" cy="0"/>
+          <a:chOff x="0" y="0"/>
+          <a:chExt cx="0" cy="0"/>
+        </a:xfrm>
+      </p:grpSpPr>
+      <p:sp>
+        <p:nvSpPr>
+          <p:cNvPr id="5" name="Rectangle: Rounded Corners 4">
+            <a:extLst>
+              <a:ext uri="{FF2B5EF4-FFF2-40B4-BE49-F238E27FC236}">
+                <a16:creationId xmlns:a16="http://schemas.microsoft.com/office/drawing/2014/main" id="{FC59C54B-776C-ACB1-7A07-FA015C7899A5}"/>
+              </a:ext>
+            </a:extLst>
+          </p:cNvPr>
+          <p:cNvSpPr/>
+          <p:nvPr/>
+        </p:nvSpPr>
+        <p:spPr>
+          <a:xfrm>
+            <a:off x="3347357" y="3731598"/>
+            <a:ext cx="2930979" cy="1150645"/>
+          </a:xfrm>
+          <a:prstGeom prst="roundRect">
+            <a:avLst/>
+          </a:prstGeom>
+          <a:solidFill>
+            <a:schemeClr val="bg1"/>
+          </a:solidFill>
+        </p:spPr>
+        <p:style>
+          <a:lnRef idx="2">
+            <a:schemeClr val="accent1">
+              <a:shade val="15000"/>
+            </a:schemeClr>
+          </a:lnRef>
+          <a:fillRef idx="1">
+            <a:schemeClr val="accent1"/>
+          </a:fillRef>
+          <a:effectRef idx="0">
+            <a:schemeClr val="accent1"/>
+          </a:effectRef>
+          <a:fontRef idx="minor">
+            <a:schemeClr val="lt1"/>
+          </a:fontRef>
+        </p:style>
+        <p:txBody>
+          <a:bodyPr rtlCol="0" anchor="t"/>
+          <a:lstStyle/>
+          <a:p>
+            <a:pPr algn="ctr"/>
+            <a:endParaRPr lang="en-US" sz="800" b="1" dirty="0">
+              <a:solidFill>
+                <a:schemeClr val="tx1"/>
+              </a:solidFill>
+            </a:endParaRPr>
+          </a:p>
+          <a:p>
+            <a:pPr algn="ctr"/>
+            <a:endParaRPr lang="en-US" sz="800" b="1" dirty="0">
+              <a:solidFill>
+                <a:schemeClr val="bg2">
+                  <a:lumMod val="75000"/>
+                </a:schemeClr>
+              </a:solidFill>
+            </a:endParaRPr>
+          </a:p>
+          <a:p>
+            <a:pPr algn="ctr"/>
+            <a:endParaRPr lang="en-US" sz="800" b="1" dirty="0">
+              <a:solidFill>
+                <a:schemeClr val="bg2">
+                  <a:lumMod val="75000"/>
+                </a:schemeClr>
+              </a:solidFill>
+            </a:endParaRPr>
+          </a:p>
+          <a:p>
+            <a:pPr algn="ctr"/>
+            <a:endParaRPr lang="en-US" sz="800" b="1" dirty="0">
+              <a:solidFill>
+                <a:schemeClr val="bg2">
+                  <a:lumMod val="75000"/>
+                </a:schemeClr>
+              </a:solidFill>
+            </a:endParaRPr>
+          </a:p>
+          <a:p>
+            <a:pPr algn="ctr"/>
+            <a:endParaRPr lang="en-US" sz="800" b="1" dirty="0">
+              <a:solidFill>
+                <a:schemeClr val="bg2">
+                  <a:lumMod val="75000"/>
+                </a:schemeClr>
+              </a:solidFill>
+            </a:endParaRPr>
+          </a:p>
+          <a:p>
+            <a:pPr algn="ctr"/>
+            <a:r>
+              <a:rPr lang="en-US" sz="800" b="1" dirty="0">
+                <a:solidFill>
+                  <a:schemeClr val="bg2">
+                    <a:lumMod val="75000"/>
+                  </a:schemeClr>
+                </a:solidFill>
+              </a:rPr>
+              <a:t>Edge node #1</a:t>
+            </a:r>
+          </a:p>
+          <a:p>
+            <a:pPr algn="ctr"/>
+            <a:r>
+              <a:rPr lang="en-US" sz="800" b="1" dirty="0">
+                <a:solidFill>
+                  <a:schemeClr val="bg2">
+                    <a:lumMod val="75000"/>
+                  </a:schemeClr>
+                </a:solidFill>
+              </a:rPr>
+              <a:t>D-UPF-1(SE350-1)</a:t>
+            </a:r>
+          </a:p>
+          <a:p>
+            <a:pPr algn="ctr"/>
+            <a:r>
+              <a:rPr lang="en-US" sz="800" b="1" dirty="0">
+                <a:solidFill>
+                  <a:schemeClr val="bg2">
+                    <a:lumMod val="75000"/>
+                  </a:schemeClr>
+                </a:solidFill>
+                <a:highlight>
+                  <a:srgbClr val="00FF00"/>
+                </a:highlight>
+              </a:rPr>
+              <a:t>10.17.7.158</a:t>
+            </a:r>
+          </a:p>
+        </p:txBody>
+      </p:sp>
+      <p:sp>
+        <p:nvSpPr>
+          <p:cNvPr id="6" name="Rectangle: Rounded Corners 5">
+            <a:extLst>
+              <a:ext uri="{FF2B5EF4-FFF2-40B4-BE49-F238E27FC236}">
+                <a16:creationId xmlns:a16="http://schemas.microsoft.com/office/drawing/2014/main" id="{740E8C97-FB2D-583F-F4CE-D27919CFB337}"/>
+              </a:ext>
+            </a:extLst>
+          </p:cNvPr>
+          <p:cNvSpPr/>
+          <p:nvPr/>
+        </p:nvSpPr>
+        <p:spPr>
+          <a:xfrm>
+            <a:off x="1600340" y="3731598"/>
+            <a:ext cx="1526532" cy="1150125"/>
+          </a:xfrm>
+          <a:prstGeom prst="roundRect">
+            <a:avLst/>
+          </a:prstGeom>
+          <a:solidFill>
+            <a:schemeClr val="bg1"/>
+          </a:solidFill>
+        </p:spPr>
+        <p:style>
+          <a:lnRef idx="2">
+            <a:schemeClr val="accent1">
+              <a:shade val="15000"/>
+            </a:schemeClr>
+          </a:lnRef>
+          <a:fillRef idx="1">
+            <a:schemeClr val="accent1"/>
+          </a:fillRef>
+          <a:effectRef idx="0">
+            <a:schemeClr val="accent1"/>
+          </a:effectRef>
+          <a:fontRef idx="minor">
+            <a:schemeClr val="lt1"/>
+          </a:fontRef>
+        </p:style>
+        <p:txBody>
+          <a:bodyPr rtlCol="0" anchor="t"/>
+          <a:lstStyle/>
+          <a:p>
+            <a:pPr algn="ctr"/>
+            <a:endParaRPr lang="en-US" sz="800" b="1" dirty="0">
+              <a:solidFill>
+                <a:schemeClr val="tx1"/>
+              </a:solidFill>
+              <a:highlight>
+                <a:srgbClr val="00FF00"/>
+              </a:highlight>
+            </a:endParaRPr>
+          </a:p>
+          <a:p>
+            <a:pPr algn="ctr"/>
+            <a:endParaRPr lang="en-US" sz="800" b="1" dirty="0">
+              <a:solidFill>
+                <a:schemeClr val="tx1"/>
+              </a:solidFill>
+              <a:highlight>
+                <a:srgbClr val="00FF00"/>
+              </a:highlight>
+            </a:endParaRPr>
+          </a:p>
+          <a:p>
+            <a:pPr algn="ctr"/>
+            <a:endParaRPr lang="en-US" sz="800" b="1" dirty="0">
+              <a:solidFill>
+                <a:schemeClr val="tx1"/>
+              </a:solidFill>
+              <a:highlight>
+                <a:srgbClr val="00FF00"/>
+              </a:highlight>
+            </a:endParaRPr>
+          </a:p>
+          <a:p>
+            <a:pPr algn="ctr"/>
+            <a:endParaRPr lang="en-US" sz="800" b="1" dirty="0">
+              <a:solidFill>
+                <a:schemeClr val="tx1"/>
+              </a:solidFill>
+              <a:highlight>
+                <a:srgbClr val="00FF00"/>
+              </a:highlight>
+            </a:endParaRPr>
+          </a:p>
+          <a:p>
+            <a:pPr algn="ctr"/>
+            <a:endParaRPr lang="en-US" sz="800" b="1" dirty="0">
+              <a:solidFill>
+                <a:schemeClr val="tx1"/>
+              </a:solidFill>
+              <a:highlight>
+                <a:srgbClr val="00FF00"/>
+              </a:highlight>
+            </a:endParaRPr>
+          </a:p>
+          <a:p>
+            <a:pPr algn="ctr"/>
+            <a:r>
+              <a:rPr lang="en-US" sz="800" b="1" dirty="0">
+                <a:solidFill>
+                  <a:schemeClr val="bg2">
+                    <a:lumMod val="75000"/>
+                  </a:schemeClr>
+                </a:solidFill>
+              </a:rPr>
+              <a:t>Edge node #2</a:t>
+            </a:r>
+          </a:p>
+          <a:p>
+            <a:pPr algn="ctr"/>
+            <a:r>
+              <a:rPr lang="en-US" sz="800" b="1" dirty="0">
+                <a:solidFill>
+                  <a:schemeClr val="bg2">
+                    <a:lumMod val="75000"/>
+                  </a:schemeClr>
+                </a:solidFill>
+              </a:rPr>
+              <a:t>D-UPF-2 (SE350-2)</a:t>
+            </a:r>
+          </a:p>
+          <a:p>
+            <a:pPr algn="ctr"/>
+            <a:r>
+              <a:rPr lang="en-US" sz="800" b="1" dirty="0">
+                <a:solidFill>
+                  <a:schemeClr val="bg2">
+                    <a:lumMod val="75000"/>
+                  </a:schemeClr>
+                </a:solidFill>
+                <a:highlight>
+                  <a:srgbClr val="00FF00"/>
+                </a:highlight>
+              </a:rPr>
+              <a:t>10.17.7.52</a:t>
+            </a:r>
+          </a:p>
+        </p:txBody>
+      </p:sp>
+      <p:sp>
+        <p:nvSpPr>
+          <p:cNvPr id="24" name="Rectangle: Rounded Corners 23">
+            <a:extLst>
+              <a:ext uri="{FF2B5EF4-FFF2-40B4-BE49-F238E27FC236}">
+                <a16:creationId xmlns:a16="http://schemas.microsoft.com/office/drawing/2014/main" id="{CD40A1B1-8815-D69F-55FA-12FCF80AE2D8}"/>
+              </a:ext>
+            </a:extLst>
+          </p:cNvPr>
+          <p:cNvSpPr/>
+          <p:nvPr/>
+        </p:nvSpPr>
+        <p:spPr>
+          <a:xfrm>
+            <a:off x="3491594" y="3851398"/>
+            <a:ext cx="1235529" cy="545126"/>
+          </a:xfrm>
+          <a:prstGeom prst="roundRect">
+            <a:avLst/>
+          </a:prstGeom>
+          <a:solidFill>
+            <a:schemeClr val="bg1"/>
+          </a:solidFill>
+        </p:spPr>
+        <p:style>
+          <a:lnRef idx="2">
+            <a:schemeClr val="accent1">
+              <a:shade val="15000"/>
+            </a:schemeClr>
+          </a:lnRef>
+          <a:fillRef idx="1">
+            <a:schemeClr val="accent1"/>
+          </a:fillRef>
+          <a:effectRef idx="0">
+            <a:schemeClr val="accent1"/>
+          </a:effectRef>
+          <a:fontRef idx="minor">
+            <a:schemeClr val="lt1"/>
+          </a:fontRef>
+        </p:style>
+        <p:txBody>
+          <a:bodyPr rtlCol="0" anchor="t"/>
+          <a:lstStyle/>
+          <a:p>
+            <a:pPr algn="ctr"/>
+            <a:r>
+              <a:rPr lang="en-US" sz="800" b="1" dirty="0">
+                <a:solidFill>
+                  <a:schemeClr val="tx1"/>
+                </a:solidFill>
+              </a:rPr>
+              <a:t>Vehicle API</a:t>
+            </a:r>
+          </a:p>
+          <a:p>
+            <a:pPr algn="ctr"/>
+            <a:r>
+              <a:rPr lang="en-US" sz="800" dirty="0">
+                <a:solidFill>
+                  <a:schemeClr val="tx1"/>
+                </a:solidFill>
+              </a:rPr>
+              <a:t>Redis </a:t>
+            </a:r>
+            <a:r>
+              <a:rPr lang="en-US" sz="800" dirty="0" err="1">
+                <a:solidFill>
+                  <a:schemeClr val="tx1"/>
+                </a:solidFill>
+              </a:rPr>
+              <a:t>db</a:t>
+            </a:r>
+            <a:r>
+              <a:rPr lang="en-US" sz="800" b="1" dirty="0">
+                <a:solidFill>
+                  <a:schemeClr val="tx1"/>
+                </a:solidFill>
+              </a:rPr>
+              <a:t> </a:t>
+            </a:r>
+            <a:r>
+              <a:rPr lang="en-US" sz="800" b="0" dirty="0">
+                <a:solidFill>
+                  <a:schemeClr val="tx1"/>
+                </a:solidFill>
+                <a:effectLst/>
+                <a:latin typeface="Consolas" panose="020B0609020204030204" pitchFamily="49" charset="0"/>
+              </a:rPr>
+              <a:t>10.17.7.158</a:t>
+            </a:r>
+            <a:r>
+              <a:rPr lang="en-US" sz="800" b="1" dirty="0">
+                <a:solidFill>
+                  <a:schemeClr val="tx1"/>
+                </a:solidFill>
+              </a:rPr>
+              <a:t>:</a:t>
+            </a:r>
+            <a:r>
+              <a:rPr lang="en-US" sz="800" b="0" dirty="0">
+                <a:solidFill>
+                  <a:schemeClr val="tx1"/>
+                </a:solidFill>
+                <a:effectLst/>
+                <a:latin typeface="Consolas" panose="020B0609020204030204" pitchFamily="49" charset="0"/>
+              </a:rPr>
+              <a:t>17935</a:t>
+            </a:r>
+            <a:endParaRPr lang="en-US" sz="300" b="1" dirty="0">
+              <a:solidFill>
+                <a:schemeClr val="tx1"/>
+              </a:solidFill>
+            </a:endParaRPr>
+          </a:p>
+        </p:txBody>
+      </p:sp>
+      <p:sp>
+        <p:nvSpPr>
+          <p:cNvPr id="10" name="Rectangle: Rounded Corners 9">
+            <a:extLst>
+              <a:ext uri="{FF2B5EF4-FFF2-40B4-BE49-F238E27FC236}">
+                <a16:creationId xmlns:a16="http://schemas.microsoft.com/office/drawing/2014/main" id="{03BF12D6-E52F-B7FA-4B1D-51F948732C78}"/>
+              </a:ext>
+            </a:extLst>
+          </p:cNvPr>
+          <p:cNvSpPr/>
+          <p:nvPr/>
+        </p:nvSpPr>
+        <p:spPr>
+          <a:xfrm>
+            <a:off x="6498821" y="3731598"/>
+            <a:ext cx="1526532" cy="1150125"/>
+          </a:xfrm>
+          <a:prstGeom prst="roundRect">
+            <a:avLst/>
+          </a:prstGeom>
+          <a:solidFill>
+            <a:schemeClr val="bg1"/>
+          </a:solidFill>
+        </p:spPr>
+        <p:style>
+          <a:lnRef idx="2">
+            <a:schemeClr val="accent1">
+              <a:shade val="15000"/>
+            </a:schemeClr>
+          </a:lnRef>
+          <a:fillRef idx="1">
+            <a:schemeClr val="accent1"/>
+          </a:fillRef>
+          <a:effectRef idx="0">
+            <a:schemeClr val="accent1"/>
+          </a:effectRef>
+          <a:fontRef idx="minor">
+            <a:schemeClr val="lt1"/>
+          </a:fontRef>
+        </p:style>
+        <p:txBody>
+          <a:bodyPr rtlCol="0" anchor="t"/>
+          <a:lstStyle/>
+          <a:p>
+            <a:pPr algn="ctr"/>
+            <a:endParaRPr lang="en-US" sz="800" b="1" dirty="0">
+              <a:solidFill>
+                <a:schemeClr val="tx1"/>
+              </a:solidFill>
+            </a:endParaRPr>
+          </a:p>
+          <a:p>
+            <a:pPr algn="ctr"/>
+            <a:endParaRPr lang="en-US" sz="800" b="1" dirty="0">
+              <a:solidFill>
+                <a:schemeClr val="tx1"/>
+              </a:solidFill>
+            </a:endParaRPr>
+          </a:p>
+          <a:p>
+            <a:pPr algn="ctr"/>
+            <a:endParaRPr lang="en-US" sz="800" b="1" dirty="0">
+              <a:solidFill>
+                <a:schemeClr val="tx1"/>
+              </a:solidFill>
+            </a:endParaRPr>
+          </a:p>
+          <a:p>
+            <a:pPr algn="ctr"/>
+            <a:endParaRPr lang="en-US" sz="800" b="1" dirty="0">
+              <a:solidFill>
+                <a:schemeClr val="tx1"/>
+              </a:solidFill>
+            </a:endParaRPr>
+          </a:p>
+          <a:p>
+            <a:pPr algn="ctr"/>
+            <a:endParaRPr lang="en-US" sz="800" b="1" i="1" dirty="0">
+              <a:solidFill>
+                <a:schemeClr val="bg2">
+                  <a:lumMod val="75000"/>
+                </a:schemeClr>
+              </a:solidFill>
+            </a:endParaRPr>
+          </a:p>
+          <a:p>
+            <a:pPr algn="ctr"/>
+            <a:r>
+              <a:rPr lang="en-US" sz="800" b="1" dirty="0">
+                <a:solidFill>
+                  <a:schemeClr val="bg2">
+                    <a:lumMod val="75000"/>
+                  </a:schemeClr>
+                </a:solidFill>
+              </a:rPr>
+              <a:t>VM1</a:t>
+            </a:r>
+          </a:p>
+          <a:p>
+            <a:pPr algn="ctr"/>
+            <a:r>
+              <a:rPr lang="en-US" sz="800" b="1" dirty="0">
+                <a:solidFill>
+                  <a:schemeClr val="bg2">
+                    <a:lumMod val="75000"/>
+                  </a:schemeClr>
+                </a:solidFill>
+              </a:rPr>
+              <a:t>Backend</a:t>
+            </a:r>
+          </a:p>
+          <a:p>
+            <a:pPr algn="ctr"/>
+            <a:r>
+              <a:rPr lang="en-US" sz="800" b="1" dirty="0">
+                <a:solidFill>
+                  <a:schemeClr val="bg2">
+                    <a:lumMod val="75000"/>
+                  </a:schemeClr>
+                </a:solidFill>
+                <a:highlight>
+                  <a:srgbClr val="00FF00"/>
+                </a:highlight>
+              </a:rPr>
+              <a:t>10.17.252.101</a:t>
+            </a:r>
+          </a:p>
+        </p:txBody>
+      </p:sp>
+      <p:sp>
+        <p:nvSpPr>
+          <p:cNvPr id="11" name="Rectangle: Rounded Corners 10">
+            <a:extLst>
+              <a:ext uri="{FF2B5EF4-FFF2-40B4-BE49-F238E27FC236}">
+                <a16:creationId xmlns:a16="http://schemas.microsoft.com/office/drawing/2014/main" id="{CB454ECE-0EFC-236A-C49D-43E3C2664F65}"/>
+              </a:ext>
+            </a:extLst>
+          </p:cNvPr>
+          <p:cNvSpPr/>
+          <p:nvPr/>
+        </p:nvSpPr>
+        <p:spPr>
+          <a:xfrm>
+            <a:off x="4947608" y="3845114"/>
+            <a:ext cx="1235529" cy="545126"/>
+          </a:xfrm>
+          <a:prstGeom prst="roundRect">
+            <a:avLst/>
+          </a:prstGeom>
+          <a:solidFill>
+            <a:schemeClr val="bg1"/>
+          </a:solidFill>
+        </p:spPr>
+        <p:style>
+          <a:lnRef idx="2">
+            <a:schemeClr val="accent1">
+              <a:shade val="15000"/>
+            </a:schemeClr>
+          </a:lnRef>
+          <a:fillRef idx="1">
+            <a:schemeClr val="accent1"/>
+          </a:fillRef>
+          <a:effectRef idx="0">
+            <a:schemeClr val="accent1"/>
+          </a:effectRef>
+          <a:fontRef idx="minor">
+            <a:schemeClr val="lt1"/>
+          </a:fontRef>
+        </p:style>
+        <p:txBody>
+          <a:bodyPr rtlCol="0" anchor="t"/>
+          <a:lstStyle/>
+          <a:p>
+            <a:pPr algn="ctr"/>
+            <a:r>
+              <a:rPr lang="en-US" sz="800" b="1" dirty="0">
+                <a:solidFill>
+                  <a:schemeClr val="tx1"/>
+                </a:solidFill>
+              </a:rPr>
+              <a:t>Prediction SVC</a:t>
+            </a:r>
+          </a:p>
+          <a:p>
+            <a:pPr algn="ctr"/>
+            <a:r>
+              <a:rPr lang="en-US" sz="800" dirty="0">
+                <a:solidFill>
+                  <a:schemeClr val="tx1"/>
+                </a:solidFill>
+              </a:rPr>
+              <a:t>simple-helm-chart</a:t>
+            </a:r>
+          </a:p>
+        </p:txBody>
+      </p:sp>
+      <p:sp>
+        <p:nvSpPr>
+          <p:cNvPr id="12" name="Rectangle: Rounded Corners 11">
+            <a:extLst>
+              <a:ext uri="{FF2B5EF4-FFF2-40B4-BE49-F238E27FC236}">
+                <a16:creationId xmlns:a16="http://schemas.microsoft.com/office/drawing/2014/main" id="{C72BABA9-53F1-F3B1-D45E-3B1579C400D1}"/>
+              </a:ext>
+            </a:extLst>
+          </p:cNvPr>
+          <p:cNvSpPr/>
+          <p:nvPr/>
+        </p:nvSpPr>
+        <p:spPr>
+          <a:xfrm>
+            <a:off x="6599924" y="3844595"/>
+            <a:ext cx="1324326" cy="545126"/>
+          </a:xfrm>
+          <a:prstGeom prst="roundRect">
+            <a:avLst/>
+          </a:prstGeom>
+          <a:solidFill>
+            <a:schemeClr val="bg1"/>
+          </a:solidFill>
+        </p:spPr>
+        <p:style>
+          <a:lnRef idx="2">
+            <a:schemeClr val="accent1">
+              <a:shade val="15000"/>
+            </a:schemeClr>
+          </a:lnRef>
+          <a:fillRef idx="1">
+            <a:schemeClr val="accent1"/>
+          </a:fillRef>
+          <a:effectRef idx="0">
+            <a:schemeClr val="accent1"/>
+          </a:effectRef>
+          <a:fontRef idx="minor">
+            <a:schemeClr val="lt1"/>
+          </a:fontRef>
+        </p:style>
+        <p:txBody>
+          <a:bodyPr rtlCol="0" anchor="t"/>
+          <a:lstStyle/>
+          <a:p>
+            <a:pPr algn="ctr"/>
+            <a:r>
+              <a:rPr lang="en-US" sz="800" b="1" dirty="0">
+                <a:solidFill>
+                  <a:schemeClr val="tx1"/>
+                </a:solidFill>
+              </a:rPr>
+              <a:t>Central DB</a:t>
+            </a:r>
+          </a:p>
+          <a:p>
+            <a:pPr algn="ctr"/>
+            <a:r>
+              <a:rPr lang="en-US" sz="800" b="1" dirty="0" err="1">
+                <a:solidFill>
+                  <a:schemeClr val="tx1"/>
+                </a:solidFill>
+              </a:rPr>
+              <a:t>InfluxDB</a:t>
+            </a:r>
+            <a:endParaRPr lang="en-US" sz="800" b="1" dirty="0">
+              <a:solidFill>
+                <a:schemeClr val="tx1"/>
+              </a:solidFill>
+            </a:endParaRPr>
+          </a:p>
+          <a:p>
+            <a:pPr algn="ctr"/>
+            <a:r>
+              <a:rPr lang="en-US" sz="800" b="0" dirty="0">
+                <a:solidFill>
+                  <a:schemeClr val="tx1"/>
+                </a:solidFill>
+                <a:effectLst/>
+                <a:latin typeface="Consolas" panose="020B0609020204030204" pitchFamily="49" charset="0"/>
+              </a:rPr>
+              <a:t>10.17.252.101:30567</a:t>
+            </a:r>
+          </a:p>
+        </p:txBody>
+      </p:sp>
+      <p:cxnSp>
+        <p:nvCxnSpPr>
+          <p:cNvPr id="14" name="Straight Arrow Connector 13">
+            <a:extLst>
+              <a:ext uri="{FF2B5EF4-FFF2-40B4-BE49-F238E27FC236}">
+                <a16:creationId xmlns:a16="http://schemas.microsoft.com/office/drawing/2014/main" id="{0F61FB55-B57C-42C1-344E-4952DDBCCC33}"/>
+              </a:ext>
+            </a:extLst>
+          </p:cNvPr>
+          <p:cNvCxnSpPr>
+            <a:cxnSpLocks/>
+            <a:stCxn id="27" idx="3"/>
+            <a:endCxn id="24" idx="1"/>
+          </p:cNvCxnSpPr>
+          <p:nvPr/>
+        </p:nvCxnSpPr>
+        <p:spPr>
+          <a:xfrm>
+            <a:off x="3016629" y="4120560"/>
+            <a:ext cx="474965" cy="3401"/>
+          </a:xfrm>
+          <a:prstGeom prst="straightConnector1">
+            <a:avLst/>
+          </a:prstGeom>
+          <a:ln>
+            <a:tailEnd type="triangle"/>
+          </a:ln>
+        </p:spPr>
+        <p:style>
+          <a:lnRef idx="1">
+            <a:schemeClr val="dk1"/>
+          </a:lnRef>
+          <a:fillRef idx="0">
+            <a:schemeClr val="dk1"/>
+          </a:fillRef>
+          <a:effectRef idx="0">
+            <a:schemeClr val="dk1"/>
+          </a:effectRef>
+          <a:fontRef idx="minor">
+            <a:schemeClr val="tx1"/>
+          </a:fontRef>
+        </p:style>
+      </p:cxnSp>
+      <p:cxnSp>
+        <p:nvCxnSpPr>
+          <p:cNvPr id="15" name="Straight Arrow Connector 14">
+            <a:extLst>
+              <a:ext uri="{FF2B5EF4-FFF2-40B4-BE49-F238E27FC236}">
+                <a16:creationId xmlns:a16="http://schemas.microsoft.com/office/drawing/2014/main" id="{3A01088F-9FD2-D907-B1DB-2AC4668ECF5A}"/>
+              </a:ext>
+            </a:extLst>
+          </p:cNvPr>
+          <p:cNvCxnSpPr>
+            <a:cxnSpLocks/>
+            <a:stCxn id="11" idx="3"/>
+          </p:cNvCxnSpPr>
+          <p:nvPr/>
+        </p:nvCxnSpPr>
+        <p:spPr>
+          <a:xfrm>
+            <a:off x="6183137" y="4117677"/>
+            <a:ext cx="416787" cy="6284"/>
+          </a:xfrm>
+          <a:prstGeom prst="straightConnector1">
+            <a:avLst/>
+          </a:prstGeom>
+          <a:ln>
+            <a:tailEnd type="triangle"/>
+          </a:ln>
+        </p:spPr>
+        <p:style>
+          <a:lnRef idx="1">
+            <a:schemeClr val="dk1"/>
+          </a:lnRef>
+          <a:fillRef idx="0">
+            <a:schemeClr val="dk1"/>
+          </a:fillRef>
+          <a:effectRef idx="0">
+            <a:schemeClr val="dk1"/>
+          </a:effectRef>
+          <a:fontRef idx="minor">
+            <a:schemeClr val="tx1"/>
+          </a:fontRef>
+        </p:style>
+      </p:cxnSp>
+      <p:cxnSp>
+        <p:nvCxnSpPr>
+          <p:cNvPr id="19" name="Straight Arrow Connector 18">
+            <a:extLst>
+              <a:ext uri="{FF2B5EF4-FFF2-40B4-BE49-F238E27FC236}">
+                <a16:creationId xmlns:a16="http://schemas.microsoft.com/office/drawing/2014/main" id="{7A536617-00A2-1FC7-6A6E-06CB74FD467B}"/>
+              </a:ext>
+            </a:extLst>
+          </p:cNvPr>
+          <p:cNvCxnSpPr>
+            <a:stCxn id="24" idx="3"/>
+            <a:endCxn id="11" idx="1"/>
+          </p:cNvCxnSpPr>
+          <p:nvPr/>
+        </p:nvCxnSpPr>
+        <p:spPr>
+          <a:xfrm flipV="1">
+            <a:off x="4727123" y="4117677"/>
+            <a:ext cx="220485" cy="6284"/>
+          </a:xfrm>
+          <a:prstGeom prst="straightConnector1">
+            <a:avLst/>
+          </a:prstGeom>
+          <a:ln>
+            <a:headEnd type="triangle"/>
+            <a:tailEnd type="triangle"/>
+          </a:ln>
+        </p:spPr>
+        <p:style>
+          <a:lnRef idx="1">
+            <a:schemeClr val="dk1"/>
+          </a:lnRef>
+          <a:fillRef idx="0">
+            <a:schemeClr val="dk1"/>
+          </a:fillRef>
+          <a:effectRef idx="0">
+            <a:schemeClr val="dk1"/>
+          </a:effectRef>
+          <a:fontRef idx="minor">
+            <a:schemeClr val="tx1"/>
+          </a:fontRef>
+        </p:style>
+      </p:cxnSp>
+      <p:sp>
+        <p:nvSpPr>
+          <p:cNvPr id="27" name="Rectangle: Rounded Corners 26">
+            <a:extLst>
+              <a:ext uri="{FF2B5EF4-FFF2-40B4-BE49-F238E27FC236}">
+                <a16:creationId xmlns:a16="http://schemas.microsoft.com/office/drawing/2014/main" id="{6BA4D951-1921-81AD-C56B-2EDD8CA2353A}"/>
+              </a:ext>
+            </a:extLst>
+          </p:cNvPr>
+          <p:cNvSpPr/>
+          <p:nvPr/>
+        </p:nvSpPr>
+        <p:spPr>
+          <a:xfrm>
+            <a:off x="1781100" y="3851398"/>
+            <a:ext cx="1235529" cy="538323"/>
+          </a:xfrm>
+          <a:prstGeom prst="roundRect">
+            <a:avLst/>
+          </a:prstGeom>
+          <a:solidFill>
+            <a:schemeClr val="bg1"/>
+          </a:solidFill>
+        </p:spPr>
+        <p:style>
+          <a:lnRef idx="2">
+            <a:schemeClr val="accent1">
+              <a:shade val="15000"/>
+            </a:schemeClr>
+          </a:lnRef>
+          <a:fillRef idx="1">
+            <a:schemeClr val="accent1"/>
+          </a:fillRef>
+          <a:effectRef idx="0">
+            <a:schemeClr val="accent1"/>
+          </a:effectRef>
+          <a:fontRef idx="minor">
+            <a:schemeClr val="lt1"/>
+          </a:fontRef>
+        </p:style>
+        <p:txBody>
+          <a:bodyPr rtlCol="0" anchor="t"/>
+          <a:lstStyle/>
+          <a:p>
+            <a:pPr algn="ctr"/>
+            <a:r>
+              <a:rPr lang="en-US" sz="800" b="1" dirty="0">
+                <a:solidFill>
+                  <a:schemeClr val="tx1"/>
+                </a:solidFill>
+              </a:rPr>
+              <a:t>test_script.py</a:t>
+            </a:r>
+          </a:p>
+        </p:txBody>
+      </p:sp>
+      <p:pic>
+        <p:nvPicPr>
+          <p:cNvPr id="34" name="Picture 33">
+            <a:extLst>
+              <a:ext uri="{FF2B5EF4-FFF2-40B4-BE49-F238E27FC236}">
+                <a16:creationId xmlns:a16="http://schemas.microsoft.com/office/drawing/2014/main" id="{E352810F-A084-EED5-BC21-36A8836EBF54}"/>
+              </a:ext>
+            </a:extLst>
+          </p:cNvPr>
+          <p:cNvPicPr>
+            <a:picLocks noChangeAspect="1"/>
+          </p:cNvPicPr>
+          <p:nvPr/>
+        </p:nvPicPr>
+        <p:blipFill>
+          <a:blip r:embed="rId2"/>
+          <a:stretch>
+            <a:fillRect/>
+          </a:stretch>
+        </p:blipFill>
+        <p:spPr>
+          <a:xfrm>
+            <a:off x="5281371" y="1574631"/>
+            <a:ext cx="3961431" cy="1854369"/>
+          </a:xfrm>
+          <a:prstGeom prst="rect">
+            <a:avLst/>
+          </a:prstGeom>
+        </p:spPr>
+      </p:pic>
+      <p:pic>
+        <p:nvPicPr>
+          <p:cNvPr id="36" name="Picture 35">
+            <a:extLst>
+              <a:ext uri="{FF2B5EF4-FFF2-40B4-BE49-F238E27FC236}">
+                <a16:creationId xmlns:a16="http://schemas.microsoft.com/office/drawing/2014/main" id="{5A40AA9C-76B3-212E-96B3-BBD30790CA79}"/>
+              </a:ext>
+            </a:extLst>
+          </p:cNvPr>
+          <p:cNvPicPr>
+            <a:picLocks noChangeAspect="1"/>
+          </p:cNvPicPr>
+          <p:nvPr/>
+        </p:nvPicPr>
+        <p:blipFill>
+          <a:blip r:embed="rId3"/>
+          <a:stretch>
+            <a:fillRect/>
+          </a:stretch>
+        </p:blipFill>
+        <p:spPr>
+          <a:xfrm>
+            <a:off x="1213315" y="1625243"/>
+            <a:ext cx="2371097" cy="1854370"/>
+          </a:xfrm>
+          <a:prstGeom prst="rect">
+            <a:avLst/>
+          </a:prstGeom>
+        </p:spPr>
+      </p:pic>
+      <p:cxnSp>
+        <p:nvCxnSpPr>
+          <p:cNvPr id="38" name="Straight Connector 37">
+            <a:extLst>
+              <a:ext uri="{FF2B5EF4-FFF2-40B4-BE49-F238E27FC236}">
+                <a16:creationId xmlns:a16="http://schemas.microsoft.com/office/drawing/2014/main" id="{0BD9196F-C083-EDB8-93A9-2F617E01DCC0}"/>
+              </a:ext>
+            </a:extLst>
+          </p:cNvPr>
+          <p:cNvCxnSpPr>
+            <a:stCxn id="34" idx="2"/>
+            <a:endCxn id="12" idx="0"/>
+          </p:cNvCxnSpPr>
+          <p:nvPr/>
+        </p:nvCxnSpPr>
+        <p:spPr>
+          <a:xfrm>
+            <a:off x="7262087" y="3429000"/>
+            <a:ext cx="0" cy="415595"/>
+          </a:xfrm>
+          <a:prstGeom prst="line">
+            <a:avLst/>
+          </a:prstGeom>
+        </p:spPr>
+        <p:style>
+          <a:lnRef idx="1">
+            <a:schemeClr val="dk1"/>
+          </a:lnRef>
+          <a:fillRef idx="0">
+            <a:schemeClr val="dk1"/>
+          </a:fillRef>
+          <a:effectRef idx="0">
+            <a:schemeClr val="dk1"/>
+          </a:effectRef>
+          <a:fontRef idx="minor">
+            <a:schemeClr val="tx1"/>
+          </a:fontRef>
+        </p:style>
+      </p:cxnSp>
+      <p:cxnSp>
+        <p:nvCxnSpPr>
+          <p:cNvPr id="39" name="Straight Connector 38">
+            <a:extLst>
+              <a:ext uri="{FF2B5EF4-FFF2-40B4-BE49-F238E27FC236}">
+                <a16:creationId xmlns:a16="http://schemas.microsoft.com/office/drawing/2014/main" id="{FE606D7C-B485-7C94-AB45-E1F63DF3299D}"/>
+              </a:ext>
+            </a:extLst>
+          </p:cNvPr>
+          <p:cNvCxnSpPr>
+            <a:cxnSpLocks/>
+            <a:stCxn id="36" idx="2"/>
+            <a:endCxn id="27" idx="0"/>
+          </p:cNvCxnSpPr>
+          <p:nvPr/>
+        </p:nvCxnSpPr>
+        <p:spPr>
+          <a:xfrm>
+            <a:off x="2398864" y="3479613"/>
+            <a:ext cx="1" cy="371785"/>
+          </a:xfrm>
+          <a:prstGeom prst="line">
+            <a:avLst/>
+          </a:prstGeom>
+        </p:spPr>
+        <p:style>
+          <a:lnRef idx="1">
+            <a:schemeClr val="dk1"/>
+          </a:lnRef>
+          <a:fillRef idx="0">
+            <a:schemeClr val="dk1"/>
+          </a:fillRef>
+          <a:effectRef idx="0">
+            <a:schemeClr val="dk1"/>
+          </a:effectRef>
+          <a:fontRef idx="minor">
+            <a:schemeClr val="tx1"/>
+          </a:fontRef>
+        </p:style>
+      </p:cxnSp>
+    </p:spTree>
+    <p:extLst>
+      <p:ext uri="{BB962C8B-B14F-4D97-AF65-F5344CB8AC3E}">
+        <p14:creationId xmlns:p14="http://schemas.microsoft.com/office/powerpoint/2010/main" val="2307694818"/>
+      </p:ext>
+    </p:extLst>
+  </p:cSld>
+  <p:clrMapOvr>
+    <a:masterClrMapping/>
+  </p:clrMapOvr>
+</p:sld>
+</file>
+
+<file path=ppt/slides/slide12.xml><?xml version="1.0" encoding="utf-8"?>
 <p:sld xmlns:a="http://schemas.openxmlformats.org/drawingml/2006/main" xmlns:r="http://schemas.openxmlformats.org/officeDocument/2006/relationships" xmlns:p="http://schemas.openxmlformats.org/presentationml/2006/main">
   <p:cSld>
     <p:spTree>
@@ -8271,7 +9299,7 @@
 </p:sld>
 </file>
 
-<file path=ppt/slides/slide12.xml><?xml version="1.0" encoding="utf-8"?>
+<file path=ppt/slides/slide13.xml><?xml version="1.0" encoding="utf-8"?>
 <p:sld xmlns:a="http://schemas.openxmlformats.org/drawingml/2006/main" xmlns:r="http://schemas.openxmlformats.org/officeDocument/2006/relationships" xmlns:p="http://schemas.openxmlformats.org/presentationml/2006/main">
   <p:cSld>
     <p:spTree>

</xml_diff>